<commit_message>
change chap 0 + install dev&prod
</commit_message>
<xml_diff>
--- a/presentations/Chap 0 - Guide de survie.pptx
+++ b/presentations/Chap 0 - Guide de survie.pptx
@@ -264,7 +264,7 @@
           <a:p>
             <a:fld id="{DBF8C3D7-48C3-C740-B187-2045F13E64C1}" type="datetimeFigureOut">
               <a:rPr lang="fr-FR" smtClean="0"/>
-              <a:t>06/07/2019</a:t>
+              <a:t>08/07/2019</a:t>
             </a:fld>
             <a:endParaRPr lang="fr-FR"/>
           </a:p>
@@ -462,7 +462,7 @@
           <a:p>
             <a:fld id="{DBF8C3D7-48C3-C740-B187-2045F13E64C1}" type="datetimeFigureOut">
               <a:rPr lang="fr-FR" smtClean="0"/>
-              <a:t>06/07/2019</a:t>
+              <a:t>08/07/2019</a:t>
             </a:fld>
             <a:endParaRPr lang="fr-FR"/>
           </a:p>
@@ -670,7 +670,7 @@
           <a:p>
             <a:fld id="{DBF8C3D7-48C3-C740-B187-2045F13E64C1}" type="datetimeFigureOut">
               <a:rPr lang="fr-FR" smtClean="0"/>
-              <a:t>06/07/2019</a:t>
+              <a:t>08/07/2019</a:t>
             </a:fld>
             <a:endParaRPr lang="fr-FR"/>
           </a:p>
@@ -868,7 +868,7 @@
           <a:p>
             <a:fld id="{DBF8C3D7-48C3-C740-B187-2045F13E64C1}" type="datetimeFigureOut">
               <a:rPr lang="fr-FR" smtClean="0"/>
-              <a:t>06/07/2019</a:t>
+              <a:t>08/07/2019</a:t>
             </a:fld>
             <a:endParaRPr lang="fr-FR"/>
           </a:p>
@@ -1143,7 +1143,7 @@
           <a:p>
             <a:fld id="{DBF8C3D7-48C3-C740-B187-2045F13E64C1}" type="datetimeFigureOut">
               <a:rPr lang="fr-FR" smtClean="0"/>
-              <a:t>06/07/2019</a:t>
+              <a:t>08/07/2019</a:t>
             </a:fld>
             <a:endParaRPr lang="fr-FR"/>
           </a:p>
@@ -1408,7 +1408,7 @@
           <a:p>
             <a:fld id="{DBF8C3D7-48C3-C740-B187-2045F13E64C1}" type="datetimeFigureOut">
               <a:rPr lang="fr-FR" smtClean="0"/>
-              <a:t>06/07/2019</a:t>
+              <a:t>08/07/2019</a:t>
             </a:fld>
             <a:endParaRPr lang="fr-FR"/>
           </a:p>
@@ -1820,7 +1820,7 @@
           <a:p>
             <a:fld id="{DBF8C3D7-48C3-C740-B187-2045F13E64C1}" type="datetimeFigureOut">
               <a:rPr lang="fr-FR" smtClean="0"/>
-              <a:t>06/07/2019</a:t>
+              <a:t>08/07/2019</a:t>
             </a:fld>
             <a:endParaRPr lang="fr-FR"/>
           </a:p>
@@ -1961,7 +1961,7 @@
           <a:p>
             <a:fld id="{DBF8C3D7-48C3-C740-B187-2045F13E64C1}" type="datetimeFigureOut">
               <a:rPr lang="fr-FR" smtClean="0"/>
-              <a:t>06/07/2019</a:t>
+              <a:t>08/07/2019</a:t>
             </a:fld>
             <a:endParaRPr lang="fr-FR"/>
           </a:p>
@@ -2074,7 +2074,7 @@
           <a:p>
             <a:fld id="{DBF8C3D7-48C3-C740-B187-2045F13E64C1}" type="datetimeFigureOut">
               <a:rPr lang="fr-FR" smtClean="0"/>
-              <a:t>06/07/2019</a:t>
+              <a:t>08/07/2019</a:t>
             </a:fld>
             <a:endParaRPr lang="fr-FR"/>
           </a:p>
@@ -2385,7 +2385,7 @@
           <a:p>
             <a:fld id="{DBF8C3D7-48C3-C740-B187-2045F13E64C1}" type="datetimeFigureOut">
               <a:rPr lang="fr-FR" smtClean="0"/>
-              <a:t>06/07/2019</a:t>
+              <a:t>08/07/2019</a:t>
             </a:fld>
             <a:endParaRPr lang="fr-FR"/>
           </a:p>
@@ -2673,7 +2673,7 @@
           <a:p>
             <a:fld id="{DBF8C3D7-48C3-C740-B187-2045F13E64C1}" type="datetimeFigureOut">
               <a:rPr lang="fr-FR" smtClean="0"/>
-              <a:t>06/07/2019</a:t>
+              <a:t>08/07/2019</a:t>
             </a:fld>
             <a:endParaRPr lang="fr-FR"/>
           </a:p>
@@ -2914,7 +2914,7 @@
           <a:p>
             <a:fld id="{DBF8C3D7-48C3-C740-B187-2045F13E64C1}" type="datetimeFigureOut">
               <a:rPr lang="fr-FR" smtClean="0"/>
-              <a:t>06/07/2019</a:t>
+              <a:t>08/07/2019</a:t>
             </a:fld>
             <a:endParaRPr lang="fr-FR"/>
           </a:p>
@@ -5282,7 +5282,7 @@
         <p:spPr>
           <a:xfrm>
             <a:off x="463638" y="1156845"/>
-            <a:ext cx="11075832" cy="3724096"/>
+            <a:ext cx="11075832" cy="3447098"/>
           </a:xfrm>
           <a:prstGeom prst="rect">
             <a:avLst/>
@@ -5483,9 +5483,6 @@
               <a:t> +++ (EN)</a:t>
             </a:r>
           </a:p>
-          <a:p>
-            <a:endParaRPr lang="fr-FR" dirty="0"/>
-          </a:p>
         </p:txBody>
       </p:sp>
       <p:sp>
@@ -5502,8 +5499,8 @@
         </p:nvSpPr>
         <p:spPr>
           <a:xfrm>
-            <a:off x="463638" y="4961963"/>
-            <a:ext cx="11075832" cy="1646605"/>
+            <a:off x="463638" y="4781903"/>
+            <a:ext cx="11075832" cy="1923604"/>
           </a:xfrm>
           <a:prstGeom prst="rect">
             <a:avLst/>
@@ -5575,6 +5572,22 @@
             <a:r>
               <a:rPr lang="fr-FR" dirty="0"/>
               <a:t> +++ (EN)</a:t>
+            </a:r>
+          </a:p>
+          <a:p>
+            <a:r>
+              <a:rPr lang="fr-FR" dirty="0"/>
+              <a:t>Source Django : </a:t>
+            </a:r>
+            <a:r>
+              <a:rPr lang="fr-FR" dirty="0">
+                <a:hlinkClick r:id="rId12"/>
+              </a:rPr>
+              <a:t>https://github.com/django/django</a:t>
+            </a:r>
+            <a:r>
+              <a:rPr lang="fr-FR" dirty="0"/>
+              <a:t> ++ (EN)</a:t>
             </a:r>
           </a:p>
           <a:p>
@@ -5704,7 +5717,7 @@
           <a:p>
             <a:r>
               <a:rPr lang="fr-FR" dirty="0"/>
-              <a:t>Visual Studio Code :</a:t>
+              <a:t>Visual Studio Code : </a:t>
             </a:r>
             <a:r>
               <a:rPr lang="fr-FR" dirty="0">

</xml_diff>